<commit_message>
Update emulator dependencies diagram
</commit_message>
<xml_diff>
--- a/DesktopEmulator/Emulator/Documents/Emulator compilation.pptx
+++ b/DesktopEmulator/Emulator/Documents/Emulator compilation.pptx
@@ -288,7 +288,8 @@
           <a:p>
             <a:fld id="{2F5CE93D-18B5-4B62-8911-BD6347E26FAA}" type="datetimeFigureOut">
               <a:rPr lang="es-ES" smtClean="0"/>
-              <a:t>27/07/2021</a:t>
+              <a:pPr/>
+              <a:t>22/04/2023</a:t>
             </a:fld>
             <a:endParaRPr lang="es-ES"/>
           </a:p>
@@ -330,6 +331,7 @@
           <a:p>
             <a:fld id="{E87CB322-BC57-460A-A38C-47D978ACB903}" type="slidenum">
               <a:rPr lang="es-ES" smtClean="0"/>
+              <a:pPr/>
               <a:t>‹Nº›</a:t>
             </a:fld>
             <a:endParaRPr lang="es-ES"/>
@@ -453,7 +455,8 @@
           <a:p>
             <a:fld id="{2F5CE93D-18B5-4B62-8911-BD6347E26FAA}" type="datetimeFigureOut">
               <a:rPr lang="es-ES" smtClean="0"/>
-              <a:t>27/07/2021</a:t>
+              <a:pPr/>
+              <a:t>22/04/2023</a:t>
             </a:fld>
             <a:endParaRPr lang="es-ES"/>
           </a:p>
@@ -495,6 +498,7 @@
           <a:p>
             <a:fld id="{E87CB322-BC57-460A-A38C-47D978ACB903}" type="slidenum">
               <a:rPr lang="es-ES" smtClean="0"/>
+              <a:pPr/>
               <a:t>‹Nº›</a:t>
             </a:fld>
             <a:endParaRPr lang="es-ES"/>
@@ -628,7 +632,8 @@
           <a:p>
             <a:fld id="{2F5CE93D-18B5-4B62-8911-BD6347E26FAA}" type="datetimeFigureOut">
               <a:rPr lang="es-ES" smtClean="0"/>
-              <a:t>27/07/2021</a:t>
+              <a:pPr/>
+              <a:t>22/04/2023</a:t>
             </a:fld>
             <a:endParaRPr lang="es-ES"/>
           </a:p>
@@ -670,6 +675,7 @@
           <a:p>
             <a:fld id="{E87CB322-BC57-460A-A38C-47D978ACB903}" type="slidenum">
               <a:rPr lang="es-ES" smtClean="0"/>
+              <a:pPr/>
               <a:t>‹Nº›</a:t>
             </a:fld>
             <a:endParaRPr lang="es-ES"/>
@@ -793,7 +799,8 @@
           <a:p>
             <a:fld id="{2F5CE93D-18B5-4B62-8911-BD6347E26FAA}" type="datetimeFigureOut">
               <a:rPr lang="es-ES" smtClean="0"/>
-              <a:t>27/07/2021</a:t>
+              <a:pPr/>
+              <a:t>22/04/2023</a:t>
             </a:fld>
             <a:endParaRPr lang="es-ES"/>
           </a:p>
@@ -835,6 +842,7 @@
           <a:p>
             <a:fld id="{E87CB322-BC57-460A-A38C-47D978ACB903}" type="slidenum">
               <a:rPr lang="es-ES" smtClean="0"/>
+              <a:pPr/>
               <a:t>‹Nº›</a:t>
             </a:fld>
             <a:endParaRPr lang="es-ES"/>
@@ -1034,7 +1042,8 @@
           <a:p>
             <a:fld id="{2F5CE93D-18B5-4B62-8911-BD6347E26FAA}" type="datetimeFigureOut">
               <a:rPr lang="es-ES" smtClean="0"/>
-              <a:t>27/07/2021</a:t>
+              <a:pPr/>
+              <a:t>22/04/2023</a:t>
             </a:fld>
             <a:endParaRPr lang="es-ES"/>
           </a:p>
@@ -1076,6 +1085,7 @@
           <a:p>
             <a:fld id="{E87CB322-BC57-460A-A38C-47D978ACB903}" type="slidenum">
               <a:rPr lang="es-ES" smtClean="0"/>
+              <a:pPr/>
               <a:t>‹Nº›</a:t>
             </a:fld>
             <a:endParaRPr lang="es-ES"/>
@@ -1317,7 +1327,8 @@
           <a:p>
             <a:fld id="{2F5CE93D-18B5-4B62-8911-BD6347E26FAA}" type="datetimeFigureOut">
               <a:rPr lang="es-ES" smtClean="0"/>
-              <a:t>27/07/2021</a:t>
+              <a:pPr/>
+              <a:t>22/04/2023</a:t>
             </a:fld>
             <a:endParaRPr lang="es-ES"/>
           </a:p>
@@ -1359,6 +1370,7 @@
           <a:p>
             <a:fld id="{E87CB322-BC57-460A-A38C-47D978ACB903}" type="slidenum">
               <a:rPr lang="es-ES" smtClean="0"/>
+              <a:pPr/>
               <a:t>‹Nº›</a:t>
             </a:fld>
             <a:endParaRPr lang="es-ES"/>
@@ -1734,7 +1746,8 @@
           <a:p>
             <a:fld id="{2F5CE93D-18B5-4B62-8911-BD6347E26FAA}" type="datetimeFigureOut">
               <a:rPr lang="es-ES" smtClean="0"/>
-              <a:t>27/07/2021</a:t>
+              <a:pPr/>
+              <a:t>22/04/2023</a:t>
             </a:fld>
             <a:endParaRPr lang="es-ES"/>
           </a:p>
@@ -1776,6 +1789,7 @@
           <a:p>
             <a:fld id="{E87CB322-BC57-460A-A38C-47D978ACB903}" type="slidenum">
               <a:rPr lang="es-ES" smtClean="0"/>
+              <a:pPr/>
               <a:t>‹Nº›</a:t>
             </a:fld>
             <a:endParaRPr lang="es-ES"/>
@@ -1847,7 +1861,8 @@
           <a:p>
             <a:fld id="{2F5CE93D-18B5-4B62-8911-BD6347E26FAA}" type="datetimeFigureOut">
               <a:rPr lang="es-ES" smtClean="0"/>
-              <a:t>27/07/2021</a:t>
+              <a:pPr/>
+              <a:t>22/04/2023</a:t>
             </a:fld>
             <a:endParaRPr lang="es-ES"/>
           </a:p>
@@ -1889,6 +1904,7 @@
           <a:p>
             <a:fld id="{E87CB322-BC57-460A-A38C-47D978ACB903}" type="slidenum">
               <a:rPr lang="es-ES" smtClean="0"/>
+              <a:pPr/>
               <a:t>‹Nº›</a:t>
             </a:fld>
             <a:endParaRPr lang="es-ES"/>
@@ -1937,7 +1953,8 @@
           <a:p>
             <a:fld id="{2F5CE93D-18B5-4B62-8911-BD6347E26FAA}" type="datetimeFigureOut">
               <a:rPr lang="es-ES" smtClean="0"/>
-              <a:t>27/07/2021</a:t>
+              <a:pPr/>
+              <a:t>22/04/2023</a:t>
             </a:fld>
             <a:endParaRPr lang="es-ES"/>
           </a:p>
@@ -1979,6 +1996,7 @@
           <a:p>
             <a:fld id="{E87CB322-BC57-460A-A38C-47D978ACB903}" type="slidenum">
               <a:rPr lang="es-ES" smtClean="0"/>
+              <a:pPr/>
               <a:t>‹Nº›</a:t>
             </a:fld>
             <a:endParaRPr lang="es-ES"/>
@@ -2209,7 +2227,8 @@
           <a:p>
             <a:fld id="{2F5CE93D-18B5-4B62-8911-BD6347E26FAA}" type="datetimeFigureOut">
               <a:rPr lang="es-ES" smtClean="0"/>
-              <a:t>27/07/2021</a:t>
+              <a:pPr/>
+              <a:t>22/04/2023</a:t>
             </a:fld>
             <a:endParaRPr lang="es-ES"/>
           </a:p>
@@ -2251,6 +2270,7 @@
           <a:p>
             <a:fld id="{E87CB322-BC57-460A-A38C-47D978ACB903}" type="slidenum">
               <a:rPr lang="es-ES" smtClean="0"/>
+              <a:pPr/>
               <a:t>‹Nº›</a:t>
             </a:fld>
             <a:endParaRPr lang="es-ES"/>
@@ -2457,7 +2477,8 @@
           <a:p>
             <a:fld id="{2F5CE93D-18B5-4B62-8911-BD6347E26FAA}" type="datetimeFigureOut">
               <a:rPr lang="es-ES" smtClean="0"/>
-              <a:t>27/07/2021</a:t>
+              <a:pPr/>
+              <a:t>22/04/2023</a:t>
             </a:fld>
             <a:endParaRPr lang="es-ES"/>
           </a:p>
@@ -2499,6 +2520,7 @@
           <a:p>
             <a:fld id="{E87CB322-BC57-460A-A38C-47D978ACB903}" type="slidenum">
               <a:rPr lang="es-ES" smtClean="0"/>
+              <a:pPr/>
               <a:t>‹Nº›</a:t>
             </a:fld>
             <a:endParaRPr lang="es-ES"/>
@@ -2665,7 +2687,8 @@
           <a:p>
             <a:fld id="{2F5CE93D-18B5-4B62-8911-BD6347E26FAA}" type="datetimeFigureOut">
               <a:rPr lang="es-ES" smtClean="0"/>
-              <a:t>27/07/2021</a:t>
+              <a:pPr/>
+              <a:t>22/04/2023</a:t>
             </a:fld>
             <a:endParaRPr lang="es-ES"/>
           </a:p>
@@ -2743,6 +2766,7 @@
           <a:p>
             <a:fld id="{E87CB322-BC57-460A-A38C-47D978ACB903}" type="slidenum">
               <a:rPr lang="es-ES" smtClean="0"/>
+              <a:pPr/>
               <a:t>‹Nº›</a:t>
             </a:fld>
             <a:endParaRPr lang="es-ES"/>
@@ -3327,15 +3351,7 @@
                   <a:srgbClr val="0070C0"/>
                 </a:solidFill>
               </a:rPr>
-              <a:t>Graphics</a:t>
-            </a:r>
-            <a:r>
-              <a:rPr lang="es-ES" sz="1200" smtClean="0">
-                <a:solidFill>
-                  <a:srgbClr val="0070C0"/>
-                </a:solidFill>
-              </a:rPr>
-              <a:t>:</a:t>
+              <a:t>Graphics:</a:t>
             </a:r>
           </a:p>
           <a:p>
@@ -3390,22 +3406,18 @@
                   <a:srgbClr val="0070C0"/>
                 </a:solidFill>
               </a:rPr>
-              <a:t>System</a:t>
-            </a:r>
-            <a:r>
-              <a:rPr lang="es-ES" sz="1200" smtClean="0">
-                <a:solidFill>
-                  <a:srgbClr val="0070C0"/>
-                </a:solidFill>
-              </a:rPr>
-              <a:t>:</a:t>
+              <a:t>System:</a:t>
             </a:r>
           </a:p>
           <a:p>
             <a:pPr algn="ctr"/>
             <a:r>
               <a:rPr lang="es-ES" sz="1400" smtClean="0"/>
-              <a:t>SDL2 2.0.14</a:t>
+              <a:t>SDL2 </a:t>
+            </a:r>
+            <a:r>
+              <a:rPr lang="es-ES" sz="1400" smtClean="0"/>
+              <a:t>2.26.5</a:t>
             </a:r>
             <a:endParaRPr lang="es-ES" sz="1400"/>
           </a:p>
@@ -3453,15 +3465,7 @@
                   <a:srgbClr val="0070C0"/>
                 </a:solidFill>
               </a:rPr>
-              <a:t>Images</a:t>
-            </a:r>
-            <a:r>
-              <a:rPr lang="es-ES" sz="1200" smtClean="0">
-                <a:solidFill>
-                  <a:srgbClr val="0070C0"/>
-                </a:solidFill>
-              </a:rPr>
-              <a:t>:</a:t>
+              <a:t>Images:</a:t>
             </a:r>
           </a:p>
           <a:p>
@@ -3516,15 +3520,7 @@
                   <a:srgbClr val="0070C0"/>
                 </a:solidFill>
               </a:rPr>
-              <a:t>File dialogs</a:t>
-            </a:r>
-            <a:r>
-              <a:rPr lang="es-ES" sz="1200" smtClean="0">
-                <a:solidFill>
-                  <a:srgbClr val="0070C0"/>
-                </a:solidFill>
-              </a:rPr>
-              <a:t>:</a:t>
+              <a:t>File dialogs:</a:t>
             </a:r>
           </a:p>
           <a:p>
@@ -3579,15 +3575,7 @@
                   <a:srgbClr val="0070C0"/>
                 </a:solidFill>
               </a:rPr>
-              <a:t>Graphics</a:t>
-            </a:r>
-            <a:r>
-              <a:rPr lang="es-ES" sz="1200" smtClean="0">
-                <a:solidFill>
-                  <a:srgbClr val="0070C0"/>
-                </a:solidFill>
-              </a:rPr>
-              <a:t>:</a:t>
+              <a:t>Graphics:</a:t>
             </a:r>
           </a:p>
           <a:p>
@@ -3642,15 +3630,7 @@
                   <a:srgbClr val="0070C0"/>
                 </a:solidFill>
               </a:rPr>
-              <a:t>XML</a:t>
-            </a:r>
-            <a:r>
-              <a:rPr lang="es-ES" sz="1200" smtClean="0">
-                <a:solidFill>
-                  <a:srgbClr val="0070C0"/>
-                </a:solidFill>
-              </a:rPr>
-              <a:t>:</a:t>
+              <a:t>XML:</a:t>
             </a:r>
           </a:p>
           <a:p>
@@ -3705,15 +3685,7 @@
                   <a:srgbClr val="0070C0"/>
                 </a:solidFill>
               </a:rPr>
-              <a:t>Graphics</a:t>
-            </a:r>
-            <a:r>
-              <a:rPr lang="es-ES" sz="1200" smtClean="0">
-                <a:solidFill>
-                  <a:srgbClr val="0070C0"/>
-                </a:solidFill>
-              </a:rPr>
-              <a:t>:</a:t>
+              <a:t>Graphics:</a:t>
             </a:r>
           </a:p>
           <a:p>
@@ -3768,15 +3740,7 @@
                   <a:srgbClr val="0070C0"/>
                 </a:solidFill>
               </a:rPr>
-              <a:t>GUI</a:t>
-            </a:r>
-            <a:r>
-              <a:rPr lang="es-ES" sz="1200" smtClean="0">
-                <a:solidFill>
-                  <a:srgbClr val="0070C0"/>
-                </a:solidFill>
-              </a:rPr>
-              <a:t>:</a:t>
+              <a:t>GUI:</a:t>
             </a:r>
           </a:p>
           <a:p>
@@ -3932,15 +3896,7 @@
                     <a:srgbClr val="0070C0"/>
                   </a:solidFill>
                 </a:rPr>
-                <a:t>Audio</a:t>
-              </a:r>
-              <a:r>
-                <a:rPr lang="es-ES" sz="1200" smtClean="0">
-                  <a:solidFill>
-                    <a:srgbClr val="0070C0"/>
-                  </a:solidFill>
-                </a:rPr>
-                <a:t>:</a:t>
+                <a:t>Audio:</a:t>
               </a:r>
             </a:p>
             <a:p>
@@ -3995,15 +3951,7 @@
                     <a:srgbClr val="0070C0"/>
                   </a:solidFill>
                 </a:rPr>
-                <a:t>Audio</a:t>
-              </a:r>
-              <a:r>
-                <a:rPr lang="es-ES" sz="1200" smtClean="0">
-                  <a:solidFill>
-                    <a:srgbClr val="0070C0"/>
-                  </a:solidFill>
-                </a:rPr>
-                <a:t>:</a:t>
+                <a:t>Audio:</a:t>
               </a:r>
             </a:p>
             <a:p>
@@ -4449,15 +4397,7 @@
                   <a:srgbClr val="0070C0"/>
                 </a:solidFill>
               </a:rPr>
-              <a:t>System</a:t>
-            </a:r>
-            <a:r>
-              <a:rPr lang="es-ES" sz="1200" smtClean="0">
-                <a:solidFill>
-                  <a:srgbClr val="0070C0"/>
-                </a:solidFill>
-              </a:rPr>
-              <a:t>:</a:t>
+              <a:t>System:</a:t>
             </a:r>
           </a:p>
           <a:p>

</xml_diff>

<commit_message>
Update info on emulator dependencies
</commit_message>
<xml_diff>
--- a/DesktopEmulator/Emulator/Documents/Emulator compilation.pptx
+++ b/DesktopEmulator/Emulator/Documents/Emulator compilation.pptx
@@ -289,7 +289,7 @@
             <a:fld id="{2F5CE93D-18B5-4B62-8911-BD6347E26FAA}" type="datetimeFigureOut">
               <a:rPr lang="es-ES" smtClean="0"/>
               <a:pPr/>
-              <a:t>22/04/2023</a:t>
+              <a:t>03/02/2025</a:t>
             </a:fld>
             <a:endParaRPr lang="es-ES"/>
           </a:p>
@@ -456,7 +456,7 @@
             <a:fld id="{2F5CE93D-18B5-4B62-8911-BD6347E26FAA}" type="datetimeFigureOut">
               <a:rPr lang="es-ES" smtClean="0"/>
               <a:pPr/>
-              <a:t>22/04/2023</a:t>
+              <a:t>03/02/2025</a:t>
             </a:fld>
             <a:endParaRPr lang="es-ES"/>
           </a:p>
@@ -633,7 +633,7 @@
             <a:fld id="{2F5CE93D-18B5-4B62-8911-BD6347E26FAA}" type="datetimeFigureOut">
               <a:rPr lang="es-ES" smtClean="0"/>
               <a:pPr/>
-              <a:t>22/04/2023</a:t>
+              <a:t>03/02/2025</a:t>
             </a:fld>
             <a:endParaRPr lang="es-ES"/>
           </a:p>
@@ -800,7 +800,7 @@
             <a:fld id="{2F5CE93D-18B5-4B62-8911-BD6347E26FAA}" type="datetimeFigureOut">
               <a:rPr lang="es-ES" smtClean="0"/>
               <a:pPr/>
-              <a:t>22/04/2023</a:t>
+              <a:t>03/02/2025</a:t>
             </a:fld>
             <a:endParaRPr lang="es-ES"/>
           </a:p>
@@ -1043,7 +1043,7 @@
             <a:fld id="{2F5CE93D-18B5-4B62-8911-BD6347E26FAA}" type="datetimeFigureOut">
               <a:rPr lang="es-ES" smtClean="0"/>
               <a:pPr/>
-              <a:t>22/04/2023</a:t>
+              <a:t>03/02/2025</a:t>
             </a:fld>
             <a:endParaRPr lang="es-ES"/>
           </a:p>
@@ -1328,7 +1328,7 @@
             <a:fld id="{2F5CE93D-18B5-4B62-8911-BD6347E26FAA}" type="datetimeFigureOut">
               <a:rPr lang="es-ES" smtClean="0"/>
               <a:pPr/>
-              <a:t>22/04/2023</a:t>
+              <a:t>03/02/2025</a:t>
             </a:fld>
             <a:endParaRPr lang="es-ES"/>
           </a:p>
@@ -1747,7 +1747,7 @@
             <a:fld id="{2F5CE93D-18B5-4B62-8911-BD6347E26FAA}" type="datetimeFigureOut">
               <a:rPr lang="es-ES" smtClean="0"/>
               <a:pPr/>
-              <a:t>22/04/2023</a:t>
+              <a:t>03/02/2025</a:t>
             </a:fld>
             <a:endParaRPr lang="es-ES"/>
           </a:p>
@@ -1862,7 +1862,7 @@
             <a:fld id="{2F5CE93D-18B5-4B62-8911-BD6347E26FAA}" type="datetimeFigureOut">
               <a:rPr lang="es-ES" smtClean="0"/>
               <a:pPr/>
-              <a:t>22/04/2023</a:t>
+              <a:t>03/02/2025</a:t>
             </a:fld>
             <a:endParaRPr lang="es-ES"/>
           </a:p>
@@ -1954,7 +1954,7 @@
             <a:fld id="{2F5CE93D-18B5-4B62-8911-BD6347E26FAA}" type="datetimeFigureOut">
               <a:rPr lang="es-ES" smtClean="0"/>
               <a:pPr/>
-              <a:t>22/04/2023</a:t>
+              <a:t>03/02/2025</a:t>
             </a:fld>
             <a:endParaRPr lang="es-ES"/>
           </a:p>
@@ -2228,7 +2228,7 @@
             <a:fld id="{2F5CE93D-18B5-4B62-8911-BD6347E26FAA}" type="datetimeFigureOut">
               <a:rPr lang="es-ES" smtClean="0"/>
               <a:pPr/>
-              <a:t>22/04/2023</a:t>
+              <a:t>03/02/2025</a:t>
             </a:fld>
             <a:endParaRPr lang="es-ES"/>
           </a:p>
@@ -2478,7 +2478,7 @@
             <a:fld id="{2F5CE93D-18B5-4B62-8911-BD6347E26FAA}" type="datetimeFigureOut">
               <a:rPr lang="es-ES" smtClean="0"/>
               <a:pPr/>
-              <a:t>22/04/2023</a:t>
+              <a:t>03/02/2025</a:t>
             </a:fld>
             <a:endParaRPr lang="es-ES"/>
           </a:p>
@@ -2688,7 +2688,7 @@
             <a:fld id="{2F5CE93D-18B5-4B62-8911-BD6347E26FAA}" type="datetimeFigureOut">
               <a:rPr lang="es-ES" smtClean="0"/>
               <a:pPr/>
-              <a:t>22/04/2023</a:t>
+              <a:t>03/02/2025</a:t>
             </a:fld>
             <a:endParaRPr lang="es-ES"/>
           </a:p>
@@ -3067,8 +3067,8 @@
         </p:nvSpPr>
         <p:spPr>
           <a:xfrm>
-            <a:off x="395536" y="-891480"/>
-            <a:ext cx="8208912" cy="7749480"/>
+            <a:off x="395536" y="260648"/>
+            <a:ext cx="8208912" cy="6408712"/>
           </a:xfrm>
           <a:prstGeom prst="rect">
             <a:avLst/>
@@ -3105,7 +3105,7 @@
         </p:nvSpPr>
         <p:spPr>
           <a:xfrm>
-            <a:off x="2411760" y="4293096"/>
+            <a:off x="2411760" y="4149080"/>
             <a:ext cx="1944216" cy="2160240"/>
           </a:xfrm>
           <a:prstGeom prst="roundRect">
@@ -3156,8 +3156,8 @@
         </p:nvSpPr>
         <p:spPr>
           <a:xfrm>
-            <a:off x="755576" y="836712"/>
-            <a:ext cx="3600400" cy="3168352"/>
+            <a:off x="755576" y="1988840"/>
+            <a:ext cx="3600400" cy="1800200"/>
           </a:xfrm>
           <a:prstGeom prst="roundRect">
             <a:avLst>
@@ -3207,7 +3207,7 @@
         </p:nvSpPr>
         <p:spPr>
           <a:xfrm>
-            <a:off x="6948264" y="2564904"/>
+            <a:off x="6948264" y="3068960"/>
             <a:ext cx="1296144" cy="425698"/>
           </a:xfrm>
           <a:prstGeom prst="roundRect">
@@ -3262,7 +3262,7 @@
         </p:nvSpPr>
         <p:spPr>
           <a:xfrm>
-            <a:off x="5148064" y="2564904"/>
+            <a:off x="5148064" y="3068960"/>
             <a:ext cx="1296144" cy="425698"/>
           </a:xfrm>
           <a:prstGeom prst="roundRect">
@@ -3317,7 +3317,7 @@
         </p:nvSpPr>
         <p:spPr>
           <a:xfrm>
-            <a:off x="2771800" y="2564904"/>
+            <a:off x="2771800" y="3068960"/>
             <a:ext cx="1296144" cy="425698"/>
           </a:xfrm>
           <a:prstGeom prst="roundRect">
@@ -3372,7 +3372,7 @@
         </p:nvSpPr>
         <p:spPr>
           <a:xfrm>
-            <a:off x="2771800" y="1772816"/>
+            <a:off x="2771800" y="2276872"/>
             <a:ext cx="1296144" cy="425698"/>
           </a:xfrm>
           <a:prstGeom prst="roundRect">
@@ -3413,11 +3413,7 @@
             <a:pPr algn="ctr"/>
             <a:r>
               <a:rPr lang="es-ES" sz="1400" smtClean="0"/>
-              <a:t>SDL2 </a:t>
-            </a:r>
-            <a:r>
-              <a:rPr lang="es-ES" sz="1400" smtClean="0"/>
-              <a:t>2.26.5</a:t>
+              <a:t>SDL2 2.26.5</a:t>
             </a:r>
             <a:endParaRPr lang="es-ES" sz="1400"/>
           </a:p>
@@ -3431,7 +3427,7 @@
         </p:nvSpPr>
         <p:spPr>
           <a:xfrm>
-            <a:off x="2699792" y="5157192"/>
+            <a:off x="2699792" y="5013176"/>
             <a:ext cx="1296144" cy="425698"/>
           </a:xfrm>
           <a:prstGeom prst="roundRect">
@@ -3486,7 +3482,7 @@
         </p:nvSpPr>
         <p:spPr>
           <a:xfrm>
-            <a:off x="2699792" y="5805264"/>
+            <a:off x="2699792" y="5661248"/>
             <a:ext cx="1296144" cy="425698"/>
           </a:xfrm>
           <a:prstGeom prst="roundRect">
@@ -3541,7 +3537,7 @@
         </p:nvSpPr>
         <p:spPr>
           <a:xfrm>
-            <a:off x="971600" y="2564904"/>
+            <a:off x="971600" y="3068960"/>
             <a:ext cx="1296144" cy="425698"/>
           </a:xfrm>
           <a:prstGeom prst="roundRect">
@@ -3596,7 +3592,7 @@
         </p:nvSpPr>
         <p:spPr>
           <a:xfrm>
-            <a:off x="2699792" y="4509120"/>
+            <a:off x="2699792" y="4365104"/>
             <a:ext cx="1296144" cy="425698"/>
           </a:xfrm>
           <a:prstGeom prst="roundRect">
@@ -3637,7 +3633,11 @@
             <a:pPr algn="ctr"/>
             <a:r>
               <a:rPr lang="es-ES" sz="1400" smtClean="0"/>
-              <a:t>tinyxml2 7.1.0</a:t>
+              <a:t>tinyxml2 </a:t>
+            </a:r>
+            <a:r>
+              <a:rPr lang="es-ES" sz="1400" smtClean="0"/>
+              <a:t>10.0</a:t>
             </a:r>
             <a:endParaRPr lang="es-ES" sz="1400"/>
           </a:p>
@@ -3645,13 +3645,13 @@
       </p:sp>
       <p:sp>
         <p:nvSpPr>
-          <p:cNvPr id="14" name="13 Rectángulo redondeado"/>
+          <p:cNvPr id="22" name="21 Rectángulo redondeado"/>
           <p:cNvSpPr/>
           <p:nvPr/>
         </p:nvSpPr>
         <p:spPr>
           <a:xfrm>
-            <a:off x="971600" y="3356992"/>
+            <a:off x="971600" y="2276872"/>
             <a:ext cx="1296144" cy="425698"/>
           </a:xfrm>
           <a:prstGeom prst="roundRect">
@@ -3685,61 +3685,6 @@
                   <a:srgbClr val="0070C0"/>
                 </a:solidFill>
               </a:rPr>
-              <a:t>Graphics:</a:t>
-            </a:r>
-          </a:p>
-          <a:p>
-            <a:pPr algn="ctr"/>
-            <a:r>
-              <a:rPr lang="es-ES" sz="1400" smtClean="0"/>
-              <a:t>freeglut 3.2.1</a:t>
-            </a:r>
-            <a:endParaRPr lang="es-ES" sz="1400"/>
-          </a:p>
-        </p:txBody>
-      </p:sp>
-      <p:sp>
-        <p:nvSpPr>
-          <p:cNvPr id="22" name="21 Rectángulo redondeado"/>
-          <p:cNvSpPr/>
-          <p:nvPr/>
-        </p:nvSpPr>
-        <p:spPr>
-          <a:xfrm>
-            <a:off x="971600" y="1772816"/>
-            <a:ext cx="1296144" cy="425698"/>
-          </a:xfrm>
-          <a:prstGeom prst="roundRect">
-            <a:avLst>
-              <a:gd name="adj" fmla="val 10396"/>
-            </a:avLst>
-          </a:prstGeom>
-        </p:spPr>
-        <p:style>
-          <a:lnRef idx="2">
-            <a:schemeClr val="dk1"/>
-          </a:lnRef>
-          <a:fillRef idx="1">
-            <a:schemeClr val="lt1"/>
-          </a:fillRef>
-          <a:effectRef idx="0">
-            <a:schemeClr val="dk1"/>
-          </a:effectRef>
-          <a:fontRef idx="minor">
-            <a:schemeClr val="dk1"/>
-          </a:fontRef>
-        </p:style>
-        <p:txBody>
-          <a:bodyPr rtlCol="0" anchor="ctr"/>
-          <a:lstStyle/>
-          <a:p>
-            <a:pPr algn="ctr"/>
-            <a:r>
-              <a:rPr lang="es-ES" sz="1200" smtClean="0">
-                <a:solidFill>
-                  <a:srgbClr val="0070C0"/>
-                </a:solidFill>
-              </a:rPr>
               <a:t>GUI:</a:t>
             </a:r>
           </a:p>
@@ -3764,7 +3709,7 @@
         </p:nvCxnSpPr>
         <p:spPr>
           <a:xfrm>
-            <a:off x="6444208" y="2777753"/>
+            <a:off x="6444208" y="3281809"/>
             <a:ext cx="504056" cy="0"/>
           </a:xfrm>
           <a:prstGeom prst="straightConnector1">
@@ -3797,7 +3742,7 @@
         </p:nvGrpSpPr>
         <p:grpSpPr>
           <a:xfrm>
-            <a:off x="755576" y="-459432"/>
+            <a:off x="755576" y="620688"/>
             <a:ext cx="3600400" cy="1008112"/>
             <a:chOff x="755576" y="332656"/>
             <a:chExt cx="3600400" cy="1008112"/>
@@ -4003,42 +3948,6 @@
       </p:grpSp>
       <p:cxnSp>
         <p:nvCxnSpPr>
-          <p:cNvPr id="42" name="41 Forma"/>
-          <p:cNvCxnSpPr>
-            <a:stCxn id="14" idx="3"/>
-            <a:endCxn id="7" idx="2"/>
-          </p:cNvCxnSpPr>
-          <p:nvPr/>
-        </p:nvCxnSpPr>
-        <p:spPr>
-          <a:xfrm flipV="1">
-            <a:off x="2267744" y="2990602"/>
-            <a:ext cx="1152128" cy="579239"/>
-          </a:xfrm>
-          <a:prstGeom prst="bentConnector2">
-            <a:avLst/>
-          </a:prstGeom>
-          <a:ln w="28575">
-            <a:tailEnd type="arrow"/>
-          </a:ln>
-        </p:spPr>
-        <p:style>
-          <a:lnRef idx="1">
-            <a:schemeClr val="accent1"/>
-          </a:lnRef>
-          <a:fillRef idx="0">
-            <a:schemeClr val="accent1"/>
-          </a:fillRef>
-          <a:effectRef idx="0">
-            <a:schemeClr val="accent1"/>
-          </a:effectRef>
-          <a:fontRef idx="minor">
-            <a:schemeClr val="tx1"/>
-          </a:fontRef>
-        </p:style>
-      </p:cxnSp>
-      <p:cxnSp>
-        <p:nvCxnSpPr>
           <p:cNvPr id="46" name="45 Conector recto de flecha"/>
           <p:cNvCxnSpPr>
             <a:stCxn id="22" idx="3"/>
@@ -4048,7 +3957,7 @@
         </p:nvCxnSpPr>
         <p:spPr>
           <a:xfrm>
-            <a:off x="2267744" y="1985665"/>
+            <a:off x="2267744" y="2489721"/>
             <a:ext cx="504056" cy="0"/>
           </a:xfrm>
           <a:prstGeom prst="straightConnector1">
@@ -4081,7 +3990,7 @@
         </p:nvCxnSpPr>
         <p:spPr>
           <a:xfrm>
-            <a:off x="2267744" y="2132856"/>
+            <a:off x="2267744" y="2636912"/>
             <a:ext cx="504056" cy="432048"/>
           </a:xfrm>
           <a:prstGeom prst="straightConnector1">
@@ -4117,7 +4026,7 @@
         </p:nvCxnSpPr>
         <p:spPr>
           <a:xfrm>
-            <a:off x="2267744" y="2777753"/>
+            <a:off x="2267744" y="3281809"/>
             <a:ext cx="504056" cy="0"/>
           </a:xfrm>
           <a:prstGeom prst="straightConnector1">
@@ -4153,8 +4062,8 @@
         </p:nvCxnSpPr>
         <p:spPr>
           <a:xfrm>
-            <a:off x="4067944" y="41449"/>
-            <a:ext cx="1728192" cy="2523455"/>
+            <a:off x="4067944" y="1121569"/>
+            <a:ext cx="1728192" cy="1947391"/>
           </a:xfrm>
           <a:prstGeom prst="bentConnector2">
             <a:avLst/>
@@ -4186,7 +4095,7 @@
         </p:nvCxnSpPr>
         <p:spPr>
           <a:xfrm>
-            <a:off x="4067944" y="1988840"/>
+            <a:off x="4067944" y="2492896"/>
             <a:ext cx="1440160" cy="576064"/>
           </a:xfrm>
           <a:prstGeom prst="bentConnector3">
@@ -4224,7 +4133,7 @@
         </p:nvCxnSpPr>
         <p:spPr>
           <a:xfrm>
-            <a:off x="4067944" y="2777753"/>
+            <a:off x="4067944" y="3281809"/>
             <a:ext cx="1080120" cy="0"/>
           </a:xfrm>
           <a:prstGeom prst="straightConnector1">
@@ -4259,11 +4168,13 @@
         </p:nvCxnSpPr>
         <p:spPr>
           <a:xfrm flipV="1">
-            <a:off x="3995936" y="2996952"/>
-            <a:ext cx="1512168" cy="1725017"/>
+            <a:off x="3995936" y="3501008"/>
+            <a:ext cx="1512168" cy="1076945"/>
           </a:xfrm>
-          <a:prstGeom prst="bentConnector2">
-            <a:avLst/>
+          <a:prstGeom prst="bentConnector3">
+            <a:avLst>
+              <a:gd name="adj1" fmla="val 100076"/>
+            </a:avLst>
           </a:prstGeom>
           <a:ln w="28575">
             <a:tailEnd type="arrow"/>
@@ -4295,8 +4206,8 @@
         </p:nvCxnSpPr>
         <p:spPr>
           <a:xfrm flipV="1">
-            <a:off x="3995936" y="2990602"/>
-            <a:ext cx="1800200" cy="2379439"/>
+            <a:off x="3995936" y="3494658"/>
+            <a:ext cx="1800200" cy="1731367"/>
           </a:xfrm>
           <a:prstGeom prst="bentConnector2">
             <a:avLst/>
@@ -4330,99 +4241,8 @@
         </p:nvCxnSpPr>
         <p:spPr>
           <a:xfrm flipV="1">
-            <a:off x="3995936" y="2996952"/>
-            <a:ext cx="2088232" cy="3021161"/>
-          </a:xfrm>
-          <a:prstGeom prst="bentConnector2">
-            <a:avLst/>
-          </a:prstGeom>
-          <a:ln w="28575">
-            <a:tailEnd type="arrow"/>
-          </a:ln>
-        </p:spPr>
-        <p:style>
-          <a:lnRef idx="1">
-            <a:schemeClr val="accent1"/>
-          </a:lnRef>
-          <a:fillRef idx="0">
-            <a:schemeClr val="accent1"/>
-          </a:fillRef>
-          <a:effectRef idx="0">
-            <a:schemeClr val="accent1"/>
-          </a:effectRef>
-          <a:fontRef idx="minor">
-            <a:schemeClr val="tx1"/>
-          </a:fontRef>
-        </p:style>
-      </p:cxnSp>
-      <p:sp>
-        <p:nvSpPr>
-          <p:cNvPr id="73" name="72 Rectángulo redondeado"/>
-          <p:cNvSpPr/>
-          <p:nvPr/>
-        </p:nvSpPr>
-        <p:spPr>
-          <a:xfrm>
-            <a:off x="971600" y="980728"/>
-            <a:ext cx="1512168" cy="425698"/>
-          </a:xfrm>
-          <a:prstGeom prst="roundRect">
-            <a:avLst>
-              <a:gd name="adj" fmla="val 10396"/>
-            </a:avLst>
-          </a:prstGeom>
-        </p:spPr>
-        <p:style>
-          <a:lnRef idx="2">
-            <a:schemeClr val="dk1"/>
-          </a:lnRef>
-          <a:fillRef idx="1">
-            <a:schemeClr val="lt1"/>
-          </a:fillRef>
-          <a:effectRef idx="0">
-            <a:schemeClr val="dk1"/>
-          </a:effectRef>
-          <a:fontRef idx="minor">
-            <a:schemeClr val="dk1"/>
-          </a:fontRef>
-        </p:style>
-        <p:txBody>
-          <a:bodyPr rtlCol="0" anchor="ctr"/>
-          <a:lstStyle/>
-          <a:p>
-            <a:pPr algn="ctr"/>
-            <a:r>
-              <a:rPr lang="es-ES" sz="1200" smtClean="0">
-                <a:solidFill>
-                  <a:srgbClr val="0070C0"/>
-                </a:solidFill>
-              </a:rPr>
-              <a:t>System:</a:t>
-            </a:r>
-          </a:p>
-          <a:p>
-            <a:pPr algn="ctr"/>
-            <a:r>
-              <a:rPr lang="es-ES" sz="1400" smtClean="0"/>
-              <a:t>SDL2-image  2.0.5</a:t>
-            </a:r>
-            <a:endParaRPr lang="es-ES" sz="1400"/>
-          </a:p>
-        </p:txBody>
-      </p:sp>
-      <p:cxnSp>
-        <p:nvCxnSpPr>
-          <p:cNvPr id="74" name="73 Forma"/>
-          <p:cNvCxnSpPr>
-            <a:stCxn id="73" idx="3"/>
-            <a:endCxn id="9" idx="0"/>
-          </p:cNvCxnSpPr>
-          <p:nvPr/>
-        </p:nvCxnSpPr>
-        <p:spPr>
-          <a:xfrm>
-            <a:off x="2483768" y="1193577"/>
-            <a:ext cx="936104" cy="579239"/>
+            <a:off x="3995936" y="3501008"/>
+            <a:ext cx="2088232" cy="2373089"/>
           </a:xfrm>
           <a:prstGeom prst="bentConnector2">
             <a:avLst/>

</xml_diff>